<commit_message>
Edit second assignment statement slider.
</commit_message>
<xml_diff>
--- a/public/resources/ppt-slides/assignment-statement-double-division.pptx
+++ b/public/resources/ppt-slides/assignment-statement-double-division.pptx
@@ -248,7 +248,7 @@
           <a:p>
             <a:fld id="{964302DC-9F53-934F-AE4D-0F1F197008C1}" type="datetimeFigureOut">
               <a:rPr lang="en-US" smtClean="0"/>
-              <a:t>9/15/23</a:t>
+              <a:t>2/8/24</a:t>
             </a:fld>
             <a:endParaRPr lang="en-US"/>
           </a:p>
@@ -418,7 +418,7 @@
           <a:p>
             <a:fld id="{964302DC-9F53-934F-AE4D-0F1F197008C1}" type="datetimeFigureOut">
               <a:rPr lang="en-US" smtClean="0"/>
-              <a:t>9/15/23</a:t>
+              <a:t>2/8/24</a:t>
             </a:fld>
             <a:endParaRPr lang="en-US"/>
           </a:p>
@@ -598,7 +598,7 @@
           <a:p>
             <a:fld id="{964302DC-9F53-934F-AE4D-0F1F197008C1}" type="datetimeFigureOut">
               <a:rPr lang="en-US" smtClean="0"/>
-              <a:t>9/15/23</a:t>
+              <a:t>2/8/24</a:t>
             </a:fld>
             <a:endParaRPr lang="en-US"/>
           </a:p>
@@ -768,7 +768,7 @@
           <a:p>
             <a:fld id="{964302DC-9F53-934F-AE4D-0F1F197008C1}" type="datetimeFigureOut">
               <a:rPr lang="en-US" smtClean="0"/>
-              <a:t>9/15/23</a:t>
+              <a:t>2/8/24</a:t>
             </a:fld>
             <a:endParaRPr lang="en-US"/>
           </a:p>
@@ -1012,7 +1012,7 @@
           <a:p>
             <a:fld id="{964302DC-9F53-934F-AE4D-0F1F197008C1}" type="datetimeFigureOut">
               <a:rPr lang="en-US" smtClean="0"/>
-              <a:t>9/15/23</a:t>
+              <a:t>2/8/24</a:t>
             </a:fld>
             <a:endParaRPr lang="en-US"/>
           </a:p>
@@ -1244,7 +1244,7 @@
           <a:p>
             <a:fld id="{964302DC-9F53-934F-AE4D-0F1F197008C1}" type="datetimeFigureOut">
               <a:rPr lang="en-US" smtClean="0"/>
-              <a:t>9/15/23</a:t>
+              <a:t>2/8/24</a:t>
             </a:fld>
             <a:endParaRPr lang="en-US"/>
           </a:p>
@@ -1611,7 +1611,7 @@
           <a:p>
             <a:fld id="{964302DC-9F53-934F-AE4D-0F1F197008C1}" type="datetimeFigureOut">
               <a:rPr lang="en-US" smtClean="0"/>
-              <a:t>9/15/23</a:t>
+              <a:t>2/8/24</a:t>
             </a:fld>
             <a:endParaRPr lang="en-US"/>
           </a:p>
@@ -1729,7 +1729,7 @@
           <a:p>
             <a:fld id="{964302DC-9F53-934F-AE4D-0F1F197008C1}" type="datetimeFigureOut">
               <a:rPr lang="en-US" smtClean="0"/>
-              <a:t>9/15/23</a:t>
+              <a:t>2/8/24</a:t>
             </a:fld>
             <a:endParaRPr lang="en-US"/>
           </a:p>
@@ -1824,7 +1824,7 @@
           <a:p>
             <a:fld id="{964302DC-9F53-934F-AE4D-0F1F197008C1}" type="datetimeFigureOut">
               <a:rPr lang="en-US" smtClean="0"/>
-              <a:t>9/15/23</a:t>
+              <a:t>2/8/24</a:t>
             </a:fld>
             <a:endParaRPr lang="en-US"/>
           </a:p>
@@ -2101,7 +2101,7 @@
           <a:p>
             <a:fld id="{964302DC-9F53-934F-AE4D-0F1F197008C1}" type="datetimeFigureOut">
               <a:rPr lang="en-US" smtClean="0"/>
-              <a:t>9/15/23</a:t>
+              <a:t>2/8/24</a:t>
             </a:fld>
             <a:endParaRPr lang="en-US"/>
           </a:p>
@@ -2358,7 +2358,7 @@
           <a:p>
             <a:fld id="{964302DC-9F53-934F-AE4D-0F1F197008C1}" type="datetimeFigureOut">
               <a:rPr lang="en-US" smtClean="0"/>
-              <a:t>9/15/23</a:t>
+              <a:t>2/8/24</a:t>
             </a:fld>
             <a:endParaRPr lang="en-US"/>
           </a:p>
@@ -2571,7 +2571,7 @@
           <a:p>
             <a:fld id="{964302DC-9F53-934F-AE4D-0F1F197008C1}" type="datetimeFigureOut">
               <a:rPr lang="en-US" smtClean="0"/>
-              <a:t>9/15/23</a:t>
+              <a:t>2/8/24</a:t>
             </a:fld>
             <a:endParaRPr lang="en-US"/>
           </a:p>
@@ -3117,43 +3117,6 @@
           </p:txBody>
         </p:sp>
       </p:grpSp>
-      <p:sp>
-        <p:nvSpPr>
-          <p:cNvPr id="2" name="TextBox 1">
-            <a:extLst>
-              <a:ext uri="{FF2B5EF4-FFF2-40B4-BE49-F238E27FC236}">
-                <a16:creationId xmlns:a16="http://schemas.microsoft.com/office/drawing/2014/main" id="{7896A7BA-08CF-32E6-6836-EBE01A61209D}"/>
-              </a:ext>
-            </a:extLst>
-          </p:cNvPr>
-          <p:cNvSpPr txBox="1"/>
-          <p:nvPr/>
-        </p:nvSpPr>
-        <p:spPr>
-          <a:xfrm>
-            <a:off x="487346" y="644086"/>
-            <a:ext cx="1119217" cy="376742"/>
-          </a:xfrm>
-          <a:prstGeom prst="rect">
-            <a:avLst/>
-          </a:prstGeom>
-          <a:noFill/>
-        </p:spPr>
-        <p:txBody>
-          <a:bodyPr wrap="none" rtlCol="0">
-            <a:spAutoFit/>
-          </a:bodyPr>
-          <a:lstStyle/>
-          <a:p>
-            <a:r>
-              <a:rPr lang="en-US" dirty="0">
-                <a:latin typeface="Gaegu" pitchFamily="2" charset="0"/>
-              </a:rPr>
-              <a:t>The Stack</a:t>
-            </a:r>
-          </a:p>
-        </p:txBody>
-      </p:sp>
       <p:grpSp>
         <p:nvGrpSpPr>
           <p:cNvPr id="52" name="Group 51">
@@ -6170,256 +6133,6 @@
       </p:sp>
       <p:sp>
         <p:nvSpPr>
-          <p:cNvPr id="46" name="Rectangle 45">
-            <a:extLst>
-              <a:ext uri="{FF2B5EF4-FFF2-40B4-BE49-F238E27FC236}">
-                <a16:creationId xmlns:a16="http://schemas.microsoft.com/office/drawing/2014/main" id="{98ECA304-8723-6A45-12AE-3A7F5BFDF93B}"/>
-              </a:ext>
-            </a:extLst>
-          </p:cNvPr>
-          <p:cNvSpPr/>
-          <p:nvPr/>
-        </p:nvSpPr>
-        <p:spPr>
-          <a:xfrm>
-            <a:off x="5242193" y="736923"/>
-            <a:ext cx="1895896" cy="721040"/>
-          </a:xfrm>
-          <a:custGeom>
-            <a:avLst/>
-            <a:gdLst>
-              <a:gd name="connsiteX0" fmla="*/ 0 w 1895896"/>
-              <a:gd name="connsiteY0" fmla="*/ 0 h 721040"/>
-              <a:gd name="connsiteX1" fmla="*/ 613006 w 1895896"/>
-              <a:gd name="connsiteY1" fmla="*/ 0 h 721040"/>
-              <a:gd name="connsiteX2" fmla="*/ 1244972 w 1895896"/>
-              <a:gd name="connsiteY2" fmla="*/ 0 h 721040"/>
-              <a:gd name="connsiteX3" fmla="*/ 1895896 w 1895896"/>
-              <a:gd name="connsiteY3" fmla="*/ 0 h 721040"/>
-              <a:gd name="connsiteX4" fmla="*/ 1895896 w 1895896"/>
-              <a:gd name="connsiteY4" fmla="*/ 360520 h 721040"/>
-              <a:gd name="connsiteX5" fmla="*/ 1895896 w 1895896"/>
-              <a:gd name="connsiteY5" fmla="*/ 721040 h 721040"/>
-              <a:gd name="connsiteX6" fmla="*/ 1263931 w 1895896"/>
-              <a:gd name="connsiteY6" fmla="*/ 721040 h 721040"/>
-              <a:gd name="connsiteX7" fmla="*/ 669883 w 1895896"/>
-              <a:gd name="connsiteY7" fmla="*/ 721040 h 721040"/>
-              <a:gd name="connsiteX8" fmla="*/ 0 w 1895896"/>
-              <a:gd name="connsiteY8" fmla="*/ 721040 h 721040"/>
-              <a:gd name="connsiteX9" fmla="*/ 0 w 1895896"/>
-              <a:gd name="connsiteY9" fmla="*/ 367730 h 721040"/>
-              <a:gd name="connsiteX10" fmla="*/ 0 w 1895896"/>
-              <a:gd name="connsiteY10" fmla="*/ 0 h 721040"/>
-            </a:gdLst>
-            <a:ahLst/>
-            <a:cxnLst>
-              <a:cxn ang="0">
-                <a:pos x="connsiteX0" y="connsiteY0"/>
-              </a:cxn>
-              <a:cxn ang="0">
-                <a:pos x="connsiteX1" y="connsiteY1"/>
-              </a:cxn>
-              <a:cxn ang="0">
-                <a:pos x="connsiteX2" y="connsiteY2"/>
-              </a:cxn>
-              <a:cxn ang="0">
-                <a:pos x="connsiteX3" y="connsiteY3"/>
-              </a:cxn>
-              <a:cxn ang="0">
-                <a:pos x="connsiteX4" y="connsiteY4"/>
-              </a:cxn>
-              <a:cxn ang="0">
-                <a:pos x="connsiteX5" y="connsiteY5"/>
-              </a:cxn>
-              <a:cxn ang="0">
-                <a:pos x="connsiteX6" y="connsiteY6"/>
-              </a:cxn>
-              <a:cxn ang="0">
-                <a:pos x="connsiteX7" y="connsiteY7"/>
-              </a:cxn>
-              <a:cxn ang="0">
-                <a:pos x="connsiteX8" y="connsiteY8"/>
-              </a:cxn>
-              <a:cxn ang="0">
-                <a:pos x="connsiteX9" y="connsiteY9"/>
-              </a:cxn>
-              <a:cxn ang="0">
-                <a:pos x="connsiteX10" y="connsiteY10"/>
-              </a:cxn>
-            </a:cxnLst>
-            <a:rect l="l" t="t" r="r" b="b"/>
-            <a:pathLst>
-              <a:path w="1895896" h="721040" fill="none" extrusionOk="0">
-                <a:moveTo>
-                  <a:pt x="0" y="0"/>
-                </a:moveTo>
-                <a:cubicBezTo>
-                  <a:pt x="259134" y="-8162"/>
-                  <a:pt x="440900" y="-20278"/>
-                  <a:pt x="613006" y="0"/>
-                </a:cubicBezTo>
-                <a:cubicBezTo>
-                  <a:pt x="785112" y="20278"/>
-                  <a:pt x="1066272" y="13606"/>
-                  <a:pt x="1244972" y="0"/>
-                </a:cubicBezTo>
-                <a:cubicBezTo>
-                  <a:pt x="1423672" y="-13606"/>
-                  <a:pt x="1573579" y="-27038"/>
-                  <a:pt x="1895896" y="0"/>
-                </a:cubicBezTo>
-                <a:cubicBezTo>
-                  <a:pt x="1907299" y="147403"/>
-                  <a:pt x="1881147" y="262385"/>
-                  <a:pt x="1895896" y="360520"/>
-                </a:cubicBezTo>
-                <a:cubicBezTo>
-                  <a:pt x="1910645" y="458655"/>
-                  <a:pt x="1909214" y="586187"/>
-                  <a:pt x="1895896" y="721040"/>
-                </a:cubicBezTo>
-                <a:cubicBezTo>
-                  <a:pt x="1655364" y="693409"/>
-                  <a:pt x="1513263" y="749881"/>
-                  <a:pt x="1263931" y="721040"/>
-                </a:cubicBezTo>
-                <a:cubicBezTo>
-                  <a:pt x="1014599" y="692199"/>
-                  <a:pt x="819474" y="711362"/>
-                  <a:pt x="669883" y="721040"/>
-                </a:cubicBezTo>
-                <a:cubicBezTo>
-                  <a:pt x="520292" y="730718"/>
-                  <a:pt x="317328" y="722022"/>
-                  <a:pt x="0" y="721040"/>
-                </a:cubicBezTo>
-                <a:cubicBezTo>
-                  <a:pt x="9430" y="575895"/>
-                  <a:pt x="-12781" y="508652"/>
-                  <a:pt x="0" y="367730"/>
-                </a:cubicBezTo>
-                <a:cubicBezTo>
-                  <a:pt x="12781" y="226808"/>
-                  <a:pt x="4225" y="147152"/>
-                  <a:pt x="0" y="0"/>
-                </a:cubicBezTo>
-                <a:close/>
-              </a:path>
-              <a:path w="1895896" h="721040" stroke="0" extrusionOk="0">
-                <a:moveTo>
-                  <a:pt x="0" y="0"/>
-                </a:moveTo>
-                <a:cubicBezTo>
-                  <a:pt x="274651" y="22862"/>
-                  <a:pt x="307875" y="21554"/>
-                  <a:pt x="613006" y="0"/>
-                </a:cubicBezTo>
-                <a:cubicBezTo>
-                  <a:pt x="918137" y="-21554"/>
-                  <a:pt x="1030203" y="-3440"/>
-                  <a:pt x="1188095" y="0"/>
-                </a:cubicBezTo>
-                <a:cubicBezTo>
-                  <a:pt x="1345987" y="3440"/>
-                  <a:pt x="1701305" y="28315"/>
-                  <a:pt x="1895896" y="0"/>
-                </a:cubicBezTo>
-                <a:cubicBezTo>
-                  <a:pt x="1893711" y="170927"/>
-                  <a:pt x="1884590" y="233651"/>
-                  <a:pt x="1895896" y="353310"/>
-                </a:cubicBezTo>
-                <a:cubicBezTo>
-                  <a:pt x="1907203" y="472969"/>
-                  <a:pt x="1894477" y="576842"/>
-                  <a:pt x="1895896" y="721040"/>
-                </a:cubicBezTo>
-                <a:cubicBezTo>
-                  <a:pt x="1718379" y="702916"/>
-                  <a:pt x="1483623" y="707961"/>
-                  <a:pt x="1301849" y="721040"/>
-                </a:cubicBezTo>
-                <a:cubicBezTo>
-                  <a:pt x="1120075" y="734119"/>
-                  <a:pt x="973613" y="745372"/>
-                  <a:pt x="707801" y="721040"/>
-                </a:cubicBezTo>
-                <a:cubicBezTo>
-                  <a:pt x="441989" y="696708"/>
-                  <a:pt x="282908" y="747318"/>
-                  <a:pt x="0" y="721040"/>
-                </a:cubicBezTo>
-                <a:cubicBezTo>
-                  <a:pt x="-12670" y="642769"/>
-                  <a:pt x="14028" y="513230"/>
-                  <a:pt x="0" y="382151"/>
-                </a:cubicBezTo>
-                <a:cubicBezTo>
-                  <a:pt x="-14028" y="251072"/>
-                  <a:pt x="-10879" y="186988"/>
-                  <a:pt x="0" y="0"/>
-                </a:cubicBezTo>
-                <a:close/>
-              </a:path>
-            </a:pathLst>
-          </a:custGeom>
-          <a:solidFill>
-            <a:schemeClr val="accent4">
-              <a:lumMod val="60000"/>
-              <a:lumOff val="40000"/>
-            </a:schemeClr>
-          </a:solidFill>
-          <a:ln w="12700">
-            <a:solidFill>
-              <a:schemeClr val="tx1"/>
-            </a:solidFill>
-            <a:extLst>
-              <a:ext uri="{C807C97D-BFC1-408E-A445-0C87EB9F89A2}">
-                <ask:lineSketchStyleProps xmlns:ask="http://schemas.microsoft.com/office/drawing/2018/sketchyshapes" sd="1219033472">
-                  <a:prstGeom prst="rect">
-                    <a:avLst/>
-                  </a:prstGeom>
-                  <ask:type>
-                    <ask:lineSketchFreehand/>
-                  </ask:type>
-                </ask:lineSketchStyleProps>
-              </a:ext>
-            </a:extLst>
-          </a:ln>
-          <a:effectLst/>
-        </p:spPr>
-        <p:style>
-          <a:lnRef idx="1">
-            <a:schemeClr val="accent4"/>
-          </a:lnRef>
-          <a:fillRef idx="2">
-            <a:schemeClr val="accent4"/>
-          </a:fillRef>
-          <a:effectRef idx="1">
-            <a:schemeClr val="accent4"/>
-          </a:effectRef>
-          <a:fontRef idx="minor">
-            <a:schemeClr val="dk1"/>
-          </a:fontRef>
-        </p:style>
-        <p:txBody>
-          <a:bodyPr rtlCol="0" anchor="ctr"/>
-          <a:lstStyle/>
-          <a:p>
-            <a:pPr algn="ctr"/>
-            <a:r>
-              <a:rPr lang="en-US" sz="1400" dirty="0" err="1"/>
-              <a:t>Change‘quotient</a:t>
-            </a:r>
-            <a:r>
-              <a:rPr lang="en-US" sz="1400" dirty="0"/>
-              <a:t>’ from an int to a double</a:t>
-            </a:r>
-          </a:p>
-        </p:txBody>
-      </p:sp>
-      <p:sp>
-        <p:nvSpPr>
           <p:cNvPr id="43" name="TextBox 42">
             <a:extLst>
               <a:ext uri="{FF2B5EF4-FFF2-40B4-BE49-F238E27FC236}">
@@ -7198,50 +6911,6 @@
           </p:txBody>
         </p:sp>
       </p:grpSp>
-      <p:sp>
-        <p:nvSpPr>
-          <p:cNvPr id="79" name="TextBox 78">
-            <a:extLst>
-              <a:ext uri="{FF2B5EF4-FFF2-40B4-BE49-F238E27FC236}">
-                <a16:creationId xmlns:a16="http://schemas.microsoft.com/office/drawing/2014/main" id="{42C554E0-9F37-C3F0-21F3-43D8C4851772}"/>
-              </a:ext>
-            </a:extLst>
-          </p:cNvPr>
-          <p:cNvSpPr txBox="1"/>
-          <p:nvPr/>
-        </p:nvSpPr>
-        <p:spPr>
-          <a:xfrm>
-            <a:off x="47480" y="101726"/>
-            <a:ext cx="5678827" cy="369332"/>
-          </a:xfrm>
-          <a:prstGeom prst="rect">
-            <a:avLst/>
-          </a:prstGeom>
-          <a:noFill/>
-        </p:spPr>
-        <p:txBody>
-          <a:bodyPr wrap="square">
-            <a:spAutoFit/>
-          </a:bodyPr>
-          <a:lstStyle/>
-          <a:p>
-            <a:r>
-              <a:rPr lang="en-US" dirty="0">
-                <a:latin typeface="Gaegu" pitchFamily="2" charset="0"/>
-              </a:rPr>
-              <a:t>Assignment – </a:t>
-            </a:r>
-            <a:r>
-              <a:rPr lang="en-US" b="1" dirty="0">
-                <a:latin typeface="Gaegu" pitchFamily="2" charset="0"/>
-              </a:rPr>
-              <a:t>how does the sequence work for a double?</a:t>
-            </a:r>
-            <a:endParaRPr lang="en-US" b="1" dirty="0"/>
-          </a:p>
-        </p:txBody>
-      </p:sp>
       <p:sp>
         <p:nvSpPr>
           <p:cNvPr id="38" name="Rectangle 37">
@@ -7574,6 +7243,43 @@
           </a:fontRef>
         </p:style>
       </p:cxnSp>
+      <p:sp>
+        <p:nvSpPr>
+          <p:cNvPr id="16" name="TextBox 15">
+            <a:extLst>
+              <a:ext uri="{FF2B5EF4-FFF2-40B4-BE49-F238E27FC236}">
+                <a16:creationId xmlns:a16="http://schemas.microsoft.com/office/drawing/2014/main" id="{C8743150-8838-60FB-EBD3-966CEF2AF3FE}"/>
+              </a:ext>
+            </a:extLst>
+          </p:cNvPr>
+          <p:cNvSpPr txBox="1"/>
+          <p:nvPr/>
+        </p:nvSpPr>
+        <p:spPr>
+          <a:xfrm>
+            <a:off x="6318654" y="213481"/>
+            <a:ext cx="923651" cy="369332"/>
+          </a:xfrm>
+          <a:prstGeom prst="rect">
+            <a:avLst/>
+          </a:prstGeom>
+          <a:noFill/>
+        </p:spPr>
+        <p:txBody>
+          <a:bodyPr wrap="none" rtlCol="0">
+            <a:spAutoFit/>
+          </a:bodyPr>
+          <a:lstStyle/>
+          <a:p>
+            <a:r>
+              <a:rPr lang="en-US" dirty="0">
+                <a:latin typeface="Gaegu" pitchFamily="2" charset="0"/>
+              </a:rPr>
+              <a:t>Memory</a:t>
+            </a:r>
+          </a:p>
+        </p:txBody>
+      </p:sp>
     </p:spTree>
     <p:extLst>
       <p:ext uri="{BB962C8B-B14F-4D97-AF65-F5344CB8AC3E}">
@@ -10260,310 +9966,6 @@
               </a:rPr>
               <a:t>5c</a:t>
             </a:r>
-          </a:p>
-        </p:txBody>
-      </p:sp>
-      <p:sp>
-        <p:nvSpPr>
-          <p:cNvPr id="81" name="Rectangle 80">
-            <a:extLst>
-              <a:ext uri="{FF2B5EF4-FFF2-40B4-BE49-F238E27FC236}">
-                <a16:creationId xmlns:a16="http://schemas.microsoft.com/office/drawing/2014/main" id="{56094979-8373-9023-CD46-730F8BEC16AA}"/>
-              </a:ext>
-            </a:extLst>
-          </p:cNvPr>
-          <p:cNvSpPr/>
-          <p:nvPr/>
-        </p:nvSpPr>
-        <p:spPr>
-          <a:xfrm>
-            <a:off x="5175454" y="780111"/>
-            <a:ext cx="2000410" cy="949615"/>
-          </a:xfrm>
-          <a:custGeom>
-            <a:avLst/>
-            <a:gdLst>
-              <a:gd name="connsiteX0" fmla="*/ 0 w 2000410"/>
-              <a:gd name="connsiteY0" fmla="*/ 0 h 949615"/>
-              <a:gd name="connsiteX1" fmla="*/ 646799 w 2000410"/>
-              <a:gd name="connsiteY1" fmla="*/ 0 h 949615"/>
-              <a:gd name="connsiteX2" fmla="*/ 1313603 w 2000410"/>
-              <a:gd name="connsiteY2" fmla="*/ 0 h 949615"/>
-              <a:gd name="connsiteX3" fmla="*/ 2000410 w 2000410"/>
-              <a:gd name="connsiteY3" fmla="*/ 0 h 949615"/>
-              <a:gd name="connsiteX4" fmla="*/ 2000410 w 2000410"/>
-              <a:gd name="connsiteY4" fmla="*/ 474808 h 949615"/>
-              <a:gd name="connsiteX5" fmla="*/ 2000410 w 2000410"/>
-              <a:gd name="connsiteY5" fmla="*/ 949615 h 949615"/>
-              <a:gd name="connsiteX6" fmla="*/ 1333607 w 2000410"/>
-              <a:gd name="connsiteY6" fmla="*/ 949615 h 949615"/>
-              <a:gd name="connsiteX7" fmla="*/ 706812 w 2000410"/>
-              <a:gd name="connsiteY7" fmla="*/ 949615 h 949615"/>
-              <a:gd name="connsiteX8" fmla="*/ 0 w 2000410"/>
-              <a:gd name="connsiteY8" fmla="*/ 949615 h 949615"/>
-              <a:gd name="connsiteX9" fmla="*/ 0 w 2000410"/>
-              <a:gd name="connsiteY9" fmla="*/ 484304 h 949615"/>
-              <a:gd name="connsiteX10" fmla="*/ 0 w 2000410"/>
-              <a:gd name="connsiteY10" fmla="*/ 0 h 949615"/>
-            </a:gdLst>
-            <a:ahLst/>
-            <a:cxnLst>
-              <a:cxn ang="0">
-                <a:pos x="connsiteX0" y="connsiteY0"/>
-              </a:cxn>
-              <a:cxn ang="0">
-                <a:pos x="connsiteX1" y="connsiteY1"/>
-              </a:cxn>
-              <a:cxn ang="0">
-                <a:pos x="connsiteX2" y="connsiteY2"/>
-              </a:cxn>
-              <a:cxn ang="0">
-                <a:pos x="connsiteX3" y="connsiteY3"/>
-              </a:cxn>
-              <a:cxn ang="0">
-                <a:pos x="connsiteX4" y="connsiteY4"/>
-              </a:cxn>
-              <a:cxn ang="0">
-                <a:pos x="connsiteX5" y="connsiteY5"/>
-              </a:cxn>
-              <a:cxn ang="0">
-                <a:pos x="connsiteX6" y="connsiteY6"/>
-              </a:cxn>
-              <a:cxn ang="0">
-                <a:pos x="connsiteX7" y="connsiteY7"/>
-              </a:cxn>
-              <a:cxn ang="0">
-                <a:pos x="connsiteX8" y="connsiteY8"/>
-              </a:cxn>
-              <a:cxn ang="0">
-                <a:pos x="connsiteX9" y="connsiteY9"/>
-              </a:cxn>
-              <a:cxn ang="0">
-                <a:pos x="connsiteX10" y="connsiteY10"/>
-              </a:cxn>
-            </a:cxnLst>
-            <a:rect l="l" t="t" r="r" b="b"/>
-            <a:pathLst>
-              <a:path w="2000410" h="949615" fill="none" extrusionOk="0">
-                <a:moveTo>
-                  <a:pt x="0" y="0"/>
-                </a:moveTo>
-                <a:cubicBezTo>
-                  <a:pt x="224698" y="11781"/>
-                  <a:pt x="504420" y="26766"/>
-                  <a:pt x="646799" y="0"/>
-                </a:cubicBezTo>
-                <a:cubicBezTo>
-                  <a:pt x="789178" y="-26766"/>
-                  <a:pt x="1170967" y="-17554"/>
-                  <a:pt x="1313603" y="0"/>
-                </a:cubicBezTo>
-                <a:cubicBezTo>
-                  <a:pt x="1456239" y="17554"/>
-                  <a:pt x="1841887" y="25840"/>
-                  <a:pt x="2000410" y="0"/>
-                </a:cubicBezTo>
-                <a:cubicBezTo>
-                  <a:pt x="1985943" y="222352"/>
-                  <a:pt x="2009295" y="284730"/>
-                  <a:pt x="2000410" y="474808"/>
-                </a:cubicBezTo>
-                <a:cubicBezTo>
-                  <a:pt x="1991525" y="664886"/>
-                  <a:pt x="2019338" y="759641"/>
-                  <a:pt x="2000410" y="949615"/>
-                </a:cubicBezTo>
-                <a:cubicBezTo>
-                  <a:pt x="1840221" y="957257"/>
-                  <a:pt x="1575724" y="975321"/>
-                  <a:pt x="1333607" y="949615"/>
-                </a:cubicBezTo>
-                <a:cubicBezTo>
-                  <a:pt x="1091490" y="923909"/>
-                  <a:pt x="959959" y="943543"/>
-                  <a:pt x="706812" y="949615"/>
-                </a:cubicBezTo>
-                <a:cubicBezTo>
-                  <a:pt x="453665" y="955687"/>
-                  <a:pt x="329300" y="962509"/>
-                  <a:pt x="0" y="949615"/>
-                </a:cubicBezTo>
-                <a:cubicBezTo>
-                  <a:pt x="15178" y="761998"/>
-                  <a:pt x="5058" y="594169"/>
-                  <a:pt x="0" y="484304"/>
-                </a:cubicBezTo>
-                <a:cubicBezTo>
-                  <a:pt x="-5058" y="374439"/>
-                  <a:pt x="13975" y="199388"/>
-                  <a:pt x="0" y="0"/>
-                </a:cubicBezTo>
-                <a:close/>
-              </a:path>
-              <a:path w="2000410" h="949615" stroke="0" extrusionOk="0">
-                <a:moveTo>
-                  <a:pt x="0" y="0"/>
-                </a:moveTo>
-                <a:cubicBezTo>
-                  <a:pt x="196304" y="-4387"/>
-                  <a:pt x="369973" y="24210"/>
-                  <a:pt x="646799" y="0"/>
-                </a:cubicBezTo>
-                <a:cubicBezTo>
-                  <a:pt x="923625" y="-24210"/>
-                  <a:pt x="1034309" y="-8748"/>
-                  <a:pt x="1253590" y="0"/>
-                </a:cubicBezTo>
-                <a:cubicBezTo>
-                  <a:pt x="1472871" y="8748"/>
-                  <a:pt x="1653296" y="28724"/>
-                  <a:pt x="2000410" y="0"/>
-                </a:cubicBezTo>
-                <a:cubicBezTo>
-                  <a:pt x="1989484" y="188282"/>
-                  <a:pt x="2003801" y="264337"/>
-                  <a:pt x="2000410" y="465311"/>
-                </a:cubicBezTo>
-                <a:cubicBezTo>
-                  <a:pt x="1997019" y="666285"/>
-                  <a:pt x="1983542" y="807697"/>
-                  <a:pt x="2000410" y="949615"/>
-                </a:cubicBezTo>
-                <a:cubicBezTo>
-                  <a:pt x="1722251" y="977316"/>
-                  <a:pt x="1514023" y="929713"/>
-                  <a:pt x="1373615" y="949615"/>
-                </a:cubicBezTo>
-                <a:cubicBezTo>
-                  <a:pt x="1233207" y="969517"/>
-                  <a:pt x="1013808" y="945872"/>
-                  <a:pt x="746820" y="949615"/>
-                </a:cubicBezTo>
-                <a:cubicBezTo>
-                  <a:pt x="479833" y="953358"/>
-                  <a:pt x="203875" y="928987"/>
-                  <a:pt x="0" y="949615"/>
-                </a:cubicBezTo>
-                <a:cubicBezTo>
-                  <a:pt x="20119" y="801219"/>
-                  <a:pt x="-9738" y="631255"/>
-                  <a:pt x="0" y="503296"/>
-                </a:cubicBezTo>
-                <a:cubicBezTo>
-                  <a:pt x="9738" y="375337"/>
-                  <a:pt x="14599" y="200193"/>
-                  <a:pt x="0" y="0"/>
-                </a:cubicBezTo>
-                <a:close/>
-              </a:path>
-            </a:pathLst>
-          </a:custGeom>
-          <a:solidFill>
-            <a:schemeClr val="accent4">
-              <a:lumMod val="60000"/>
-              <a:lumOff val="40000"/>
-            </a:schemeClr>
-          </a:solidFill>
-          <a:ln w="12700">
-            <a:solidFill>
-              <a:schemeClr val="tx1"/>
-            </a:solidFill>
-            <a:extLst>
-              <a:ext uri="{C807C97D-BFC1-408E-A445-0C87EB9F89A2}">
-                <ask:lineSketchStyleProps xmlns:ask="http://schemas.microsoft.com/office/drawing/2018/sketchyshapes" sd="1219033472">
-                  <a:prstGeom prst="rect">
-                    <a:avLst/>
-                  </a:prstGeom>
-                  <ask:type>
-                    <ask:lineSketchFreehand/>
-                  </ask:type>
-                </ask:lineSketchStyleProps>
-              </a:ext>
-            </a:extLst>
-          </a:ln>
-          <a:effectLst/>
-        </p:spPr>
-        <p:style>
-          <a:lnRef idx="1">
-            <a:schemeClr val="accent4"/>
-          </a:lnRef>
-          <a:fillRef idx="2">
-            <a:schemeClr val="accent4"/>
-          </a:fillRef>
-          <a:effectRef idx="1">
-            <a:schemeClr val="accent4"/>
-          </a:effectRef>
-          <a:fontRef idx="minor">
-            <a:schemeClr val="dk1"/>
-          </a:fontRef>
-        </p:style>
-        <p:txBody>
-          <a:bodyPr rtlCol="0" anchor="ctr"/>
-          <a:lstStyle/>
-          <a:p>
-            <a:pPr algn="ctr"/>
-            <a:r>
-              <a:rPr lang="en-US" sz="1400" dirty="0"/>
-              <a:t>To evaluate the RHS:</a:t>
-            </a:r>
-          </a:p>
-          <a:p>
-            <a:pPr algn="ctr"/>
-            <a:r>
-              <a:rPr lang="en-US" sz="1400" dirty="0"/>
-              <a:t>- Load (5a, 5b)</a:t>
-            </a:r>
-            <a:br>
-              <a:rPr lang="en-US" sz="1400" dirty="0"/>
-            </a:br>
-            <a:r>
-              <a:rPr lang="en-US" sz="1400" dirty="0"/>
-              <a:t>- Divide (5c)…</a:t>
-            </a:r>
-          </a:p>
-        </p:txBody>
-      </p:sp>
-      <p:sp>
-        <p:nvSpPr>
-          <p:cNvPr id="83" name="TextBox 82">
-            <a:extLst>
-              <a:ext uri="{FF2B5EF4-FFF2-40B4-BE49-F238E27FC236}">
-                <a16:creationId xmlns:a16="http://schemas.microsoft.com/office/drawing/2014/main" id="{747B89AF-7F9C-D19D-9501-F1BEDB779B4D}"/>
-              </a:ext>
-            </a:extLst>
-          </p:cNvPr>
-          <p:cNvSpPr txBox="1"/>
-          <p:nvPr/>
-        </p:nvSpPr>
-        <p:spPr>
-          <a:xfrm>
-            <a:off x="47480" y="101726"/>
-            <a:ext cx="5678827" cy="369332"/>
-          </a:xfrm>
-          <a:prstGeom prst="rect">
-            <a:avLst/>
-          </a:prstGeom>
-          <a:noFill/>
-        </p:spPr>
-        <p:txBody>
-          <a:bodyPr wrap="square">
-            <a:spAutoFit/>
-          </a:bodyPr>
-          <a:lstStyle/>
-          <a:p>
-            <a:r>
-              <a:rPr lang="en-US" dirty="0">
-                <a:latin typeface="Gaegu" pitchFamily="2" charset="0"/>
-              </a:rPr>
-              <a:t>Assignment – </a:t>
-            </a:r>
-            <a:r>
-              <a:rPr lang="en-US" b="1" dirty="0">
-                <a:latin typeface="Gaegu" pitchFamily="2" charset="0"/>
-              </a:rPr>
-              <a:t>how does the sequence work for a double?</a:t>
-            </a:r>
-            <a:endParaRPr lang="en-US" b="1" dirty="0"/>
           </a:p>
         </p:txBody>
       </p:sp>
@@ -12458,10 +11860,10 @@
       </p:grpSp>
       <p:sp>
         <p:nvSpPr>
-          <p:cNvPr id="106" name="TextBox 105">
+          <p:cNvPr id="2" name="TextBox 1">
             <a:extLst>
               <a:ext uri="{FF2B5EF4-FFF2-40B4-BE49-F238E27FC236}">
-                <a16:creationId xmlns:a16="http://schemas.microsoft.com/office/drawing/2014/main" id="{499B3811-4524-8D2F-534C-670B1EA60A76}"/>
+                <a16:creationId xmlns:a16="http://schemas.microsoft.com/office/drawing/2014/main" id="{7E976702-12F3-A350-5BBB-CBE22F869EB3}"/>
               </a:ext>
             </a:extLst>
           </p:cNvPr>
@@ -12470,8 +11872,8 @@
         </p:nvSpPr>
         <p:spPr>
           <a:xfrm>
-            <a:off x="487346" y="644086"/>
-            <a:ext cx="1119217" cy="376742"/>
+            <a:off x="6318654" y="213481"/>
+            <a:ext cx="923651" cy="369332"/>
           </a:xfrm>
           <a:prstGeom prst="rect">
             <a:avLst/>
@@ -12488,7 +11890,7 @@
               <a:rPr lang="en-US" dirty="0">
                 <a:latin typeface="Gaegu" pitchFamily="2" charset="0"/>
               </a:rPr>
-              <a:t>The Stack</a:t>
+              <a:t>Memory</a:t>
             </a:r>
           </a:p>
         </p:txBody>
@@ -14194,50 +13596,6 @@
               <a:rPr lang="en-AU" dirty="0"/>
               <a:t>5.25</a:t>
             </a:r>
-          </a:p>
-        </p:txBody>
-      </p:sp>
-      <p:sp>
-        <p:nvSpPr>
-          <p:cNvPr id="83" name="TextBox 82">
-            <a:extLst>
-              <a:ext uri="{FF2B5EF4-FFF2-40B4-BE49-F238E27FC236}">
-                <a16:creationId xmlns:a16="http://schemas.microsoft.com/office/drawing/2014/main" id="{747B89AF-7F9C-D19D-9501-F1BEDB779B4D}"/>
-              </a:ext>
-            </a:extLst>
-          </p:cNvPr>
-          <p:cNvSpPr txBox="1"/>
-          <p:nvPr/>
-        </p:nvSpPr>
-        <p:spPr>
-          <a:xfrm>
-            <a:off x="47480" y="101726"/>
-            <a:ext cx="5678827" cy="369332"/>
-          </a:xfrm>
-          <a:prstGeom prst="rect">
-            <a:avLst/>
-          </a:prstGeom>
-          <a:noFill/>
-        </p:spPr>
-        <p:txBody>
-          <a:bodyPr wrap="square">
-            <a:spAutoFit/>
-          </a:bodyPr>
-          <a:lstStyle/>
-          <a:p>
-            <a:r>
-              <a:rPr lang="en-US" dirty="0">
-                <a:latin typeface="Gaegu" pitchFamily="2" charset="0"/>
-              </a:rPr>
-              <a:t>Assignment – </a:t>
-            </a:r>
-            <a:r>
-              <a:rPr lang="en-US" b="1" dirty="0">
-                <a:latin typeface="Gaegu" pitchFamily="2" charset="0"/>
-              </a:rPr>
-              <a:t>how does the sequence work for a double?</a:t>
-            </a:r>
-            <a:endParaRPr lang="en-US" b="1" dirty="0"/>
           </a:p>
         </p:txBody>
       </p:sp>
@@ -16970,264 +16328,10 @@
       </p:sp>
       <p:sp>
         <p:nvSpPr>
-          <p:cNvPr id="37" name="Rectangle 36">
+          <p:cNvPr id="2" name="TextBox 1">
             <a:extLst>
               <a:ext uri="{FF2B5EF4-FFF2-40B4-BE49-F238E27FC236}">
-                <a16:creationId xmlns:a16="http://schemas.microsoft.com/office/drawing/2014/main" id="{91B8F9CE-3496-4F9A-AB2D-8DB41499D9CB}"/>
-              </a:ext>
-            </a:extLst>
-          </p:cNvPr>
-          <p:cNvSpPr/>
-          <p:nvPr/>
-        </p:nvSpPr>
-        <p:spPr>
-          <a:xfrm>
-            <a:off x="5150143" y="770957"/>
-            <a:ext cx="2000410" cy="949615"/>
-          </a:xfrm>
-          <a:custGeom>
-            <a:avLst/>
-            <a:gdLst>
-              <a:gd name="connsiteX0" fmla="*/ 0 w 2000410"/>
-              <a:gd name="connsiteY0" fmla="*/ 0 h 949615"/>
-              <a:gd name="connsiteX1" fmla="*/ 646799 w 2000410"/>
-              <a:gd name="connsiteY1" fmla="*/ 0 h 949615"/>
-              <a:gd name="connsiteX2" fmla="*/ 1313603 w 2000410"/>
-              <a:gd name="connsiteY2" fmla="*/ 0 h 949615"/>
-              <a:gd name="connsiteX3" fmla="*/ 2000410 w 2000410"/>
-              <a:gd name="connsiteY3" fmla="*/ 0 h 949615"/>
-              <a:gd name="connsiteX4" fmla="*/ 2000410 w 2000410"/>
-              <a:gd name="connsiteY4" fmla="*/ 474808 h 949615"/>
-              <a:gd name="connsiteX5" fmla="*/ 2000410 w 2000410"/>
-              <a:gd name="connsiteY5" fmla="*/ 949615 h 949615"/>
-              <a:gd name="connsiteX6" fmla="*/ 1333607 w 2000410"/>
-              <a:gd name="connsiteY6" fmla="*/ 949615 h 949615"/>
-              <a:gd name="connsiteX7" fmla="*/ 706812 w 2000410"/>
-              <a:gd name="connsiteY7" fmla="*/ 949615 h 949615"/>
-              <a:gd name="connsiteX8" fmla="*/ 0 w 2000410"/>
-              <a:gd name="connsiteY8" fmla="*/ 949615 h 949615"/>
-              <a:gd name="connsiteX9" fmla="*/ 0 w 2000410"/>
-              <a:gd name="connsiteY9" fmla="*/ 484304 h 949615"/>
-              <a:gd name="connsiteX10" fmla="*/ 0 w 2000410"/>
-              <a:gd name="connsiteY10" fmla="*/ 0 h 949615"/>
-            </a:gdLst>
-            <a:ahLst/>
-            <a:cxnLst>
-              <a:cxn ang="0">
-                <a:pos x="connsiteX0" y="connsiteY0"/>
-              </a:cxn>
-              <a:cxn ang="0">
-                <a:pos x="connsiteX1" y="connsiteY1"/>
-              </a:cxn>
-              <a:cxn ang="0">
-                <a:pos x="connsiteX2" y="connsiteY2"/>
-              </a:cxn>
-              <a:cxn ang="0">
-                <a:pos x="connsiteX3" y="connsiteY3"/>
-              </a:cxn>
-              <a:cxn ang="0">
-                <a:pos x="connsiteX4" y="connsiteY4"/>
-              </a:cxn>
-              <a:cxn ang="0">
-                <a:pos x="connsiteX5" y="connsiteY5"/>
-              </a:cxn>
-              <a:cxn ang="0">
-                <a:pos x="connsiteX6" y="connsiteY6"/>
-              </a:cxn>
-              <a:cxn ang="0">
-                <a:pos x="connsiteX7" y="connsiteY7"/>
-              </a:cxn>
-              <a:cxn ang="0">
-                <a:pos x="connsiteX8" y="connsiteY8"/>
-              </a:cxn>
-              <a:cxn ang="0">
-                <a:pos x="connsiteX9" y="connsiteY9"/>
-              </a:cxn>
-              <a:cxn ang="0">
-                <a:pos x="connsiteX10" y="connsiteY10"/>
-              </a:cxn>
-            </a:cxnLst>
-            <a:rect l="l" t="t" r="r" b="b"/>
-            <a:pathLst>
-              <a:path w="2000410" h="949615" fill="none" extrusionOk="0">
-                <a:moveTo>
-                  <a:pt x="0" y="0"/>
-                </a:moveTo>
-                <a:cubicBezTo>
-                  <a:pt x="224698" y="11781"/>
-                  <a:pt x="504420" y="26766"/>
-                  <a:pt x="646799" y="0"/>
-                </a:cubicBezTo>
-                <a:cubicBezTo>
-                  <a:pt x="789178" y="-26766"/>
-                  <a:pt x="1170967" y="-17554"/>
-                  <a:pt x="1313603" y="0"/>
-                </a:cubicBezTo>
-                <a:cubicBezTo>
-                  <a:pt x="1456239" y="17554"/>
-                  <a:pt x="1841887" y="25840"/>
-                  <a:pt x="2000410" y="0"/>
-                </a:cubicBezTo>
-                <a:cubicBezTo>
-                  <a:pt x="1985943" y="222352"/>
-                  <a:pt x="2009295" y="284730"/>
-                  <a:pt x="2000410" y="474808"/>
-                </a:cubicBezTo>
-                <a:cubicBezTo>
-                  <a:pt x="1991525" y="664886"/>
-                  <a:pt x="2019338" y="759641"/>
-                  <a:pt x="2000410" y="949615"/>
-                </a:cubicBezTo>
-                <a:cubicBezTo>
-                  <a:pt x="1840221" y="957257"/>
-                  <a:pt x="1575724" y="975321"/>
-                  <a:pt x="1333607" y="949615"/>
-                </a:cubicBezTo>
-                <a:cubicBezTo>
-                  <a:pt x="1091490" y="923909"/>
-                  <a:pt x="959959" y="943543"/>
-                  <a:pt x="706812" y="949615"/>
-                </a:cubicBezTo>
-                <a:cubicBezTo>
-                  <a:pt x="453665" y="955687"/>
-                  <a:pt x="329300" y="962509"/>
-                  <a:pt x="0" y="949615"/>
-                </a:cubicBezTo>
-                <a:cubicBezTo>
-                  <a:pt x="15178" y="761998"/>
-                  <a:pt x="5058" y="594169"/>
-                  <a:pt x="0" y="484304"/>
-                </a:cubicBezTo>
-                <a:cubicBezTo>
-                  <a:pt x="-5058" y="374439"/>
-                  <a:pt x="13975" y="199388"/>
-                  <a:pt x="0" y="0"/>
-                </a:cubicBezTo>
-                <a:close/>
-              </a:path>
-              <a:path w="2000410" h="949615" stroke="0" extrusionOk="0">
-                <a:moveTo>
-                  <a:pt x="0" y="0"/>
-                </a:moveTo>
-                <a:cubicBezTo>
-                  <a:pt x="196304" y="-4387"/>
-                  <a:pt x="369973" y="24210"/>
-                  <a:pt x="646799" y="0"/>
-                </a:cubicBezTo>
-                <a:cubicBezTo>
-                  <a:pt x="923625" y="-24210"/>
-                  <a:pt x="1034309" y="-8748"/>
-                  <a:pt x="1253590" y="0"/>
-                </a:cubicBezTo>
-                <a:cubicBezTo>
-                  <a:pt x="1472871" y="8748"/>
-                  <a:pt x="1653296" y="28724"/>
-                  <a:pt x="2000410" y="0"/>
-                </a:cubicBezTo>
-                <a:cubicBezTo>
-                  <a:pt x="1989484" y="188282"/>
-                  <a:pt x="2003801" y="264337"/>
-                  <a:pt x="2000410" y="465311"/>
-                </a:cubicBezTo>
-                <a:cubicBezTo>
-                  <a:pt x="1997019" y="666285"/>
-                  <a:pt x="1983542" y="807697"/>
-                  <a:pt x="2000410" y="949615"/>
-                </a:cubicBezTo>
-                <a:cubicBezTo>
-                  <a:pt x="1722251" y="977316"/>
-                  <a:pt x="1514023" y="929713"/>
-                  <a:pt x="1373615" y="949615"/>
-                </a:cubicBezTo>
-                <a:cubicBezTo>
-                  <a:pt x="1233207" y="969517"/>
-                  <a:pt x="1013808" y="945872"/>
-                  <a:pt x="746820" y="949615"/>
-                </a:cubicBezTo>
-                <a:cubicBezTo>
-                  <a:pt x="479833" y="953358"/>
-                  <a:pt x="203875" y="928987"/>
-                  <a:pt x="0" y="949615"/>
-                </a:cubicBezTo>
-                <a:cubicBezTo>
-                  <a:pt x="20119" y="801219"/>
-                  <a:pt x="-9738" y="631255"/>
-                  <a:pt x="0" y="503296"/>
-                </a:cubicBezTo>
-                <a:cubicBezTo>
-                  <a:pt x="9738" y="375337"/>
-                  <a:pt x="14599" y="200193"/>
-                  <a:pt x="0" y="0"/>
-                </a:cubicBezTo>
-                <a:close/>
-              </a:path>
-            </a:pathLst>
-          </a:custGeom>
-          <a:solidFill>
-            <a:schemeClr val="accent4">
-              <a:lumMod val="60000"/>
-              <a:lumOff val="40000"/>
-            </a:schemeClr>
-          </a:solidFill>
-          <a:ln w="12700">
-            <a:solidFill>
-              <a:schemeClr val="tx1"/>
-            </a:solidFill>
-            <a:extLst>
-              <a:ext uri="{C807C97D-BFC1-408E-A445-0C87EB9F89A2}">
-                <ask:lineSketchStyleProps xmlns:ask="http://schemas.microsoft.com/office/drawing/2018/sketchyshapes" sd="1219033472">
-                  <a:prstGeom prst="rect">
-                    <a:avLst/>
-                  </a:prstGeom>
-                  <ask:type>
-                    <ask:lineSketchFreehand/>
-                  </ask:type>
-                </ask:lineSketchStyleProps>
-              </a:ext>
-            </a:extLst>
-          </a:ln>
-          <a:effectLst/>
-        </p:spPr>
-        <p:style>
-          <a:lnRef idx="1">
-            <a:schemeClr val="accent4"/>
-          </a:lnRef>
-          <a:fillRef idx="2">
-            <a:schemeClr val="accent4"/>
-          </a:fillRef>
-          <a:effectRef idx="1">
-            <a:schemeClr val="accent4"/>
-          </a:effectRef>
-          <a:fontRef idx="minor">
-            <a:schemeClr val="dk1"/>
-          </a:fontRef>
-        </p:style>
-        <p:txBody>
-          <a:bodyPr rtlCol="0" anchor="ctr"/>
-          <a:lstStyle/>
-          <a:p>
-            <a:pPr algn="ctr"/>
-            <a:r>
-              <a:rPr lang="en-US" sz="1400" dirty="0"/>
-              <a:t>Finally save the result to the variable ‘</a:t>
-            </a:r>
-            <a:r>
-              <a:rPr lang="en-US" sz="1400" dirty="0" err="1"/>
-              <a:t>quotient’on</a:t>
-            </a:r>
-            <a:r>
-              <a:rPr lang="en-US" sz="1400" dirty="0"/>
-              <a:t> the stack (5d)</a:t>
-            </a:r>
-          </a:p>
-        </p:txBody>
-      </p:sp>
-      <p:sp>
-        <p:nvSpPr>
-          <p:cNvPr id="40" name="TextBox 39">
-            <a:extLst>
-              <a:ext uri="{FF2B5EF4-FFF2-40B4-BE49-F238E27FC236}">
-                <a16:creationId xmlns:a16="http://schemas.microsoft.com/office/drawing/2014/main" id="{D5B577F0-FE5C-C46B-3EFC-094E56EE7D56}"/>
+                <a16:creationId xmlns:a16="http://schemas.microsoft.com/office/drawing/2014/main" id="{9FB3CAB8-5D2C-56B4-0A84-2091511737ED}"/>
               </a:ext>
             </a:extLst>
           </p:cNvPr>
@@ -17236,8 +16340,8 @@
         </p:nvSpPr>
         <p:spPr>
           <a:xfrm>
-            <a:off x="487346" y="644086"/>
-            <a:ext cx="1119217" cy="376742"/>
+            <a:off x="6318654" y="213481"/>
+            <a:ext cx="923651" cy="369332"/>
           </a:xfrm>
           <a:prstGeom prst="rect">
             <a:avLst/>
@@ -17254,7 +16358,7 @@
               <a:rPr lang="en-US" dirty="0">
                 <a:latin typeface="Gaegu" pitchFamily="2" charset="0"/>
               </a:rPr>
-              <a:t>The Stack</a:t>
+              <a:t>Memory</a:t>
             </a:r>
           </a:p>
         </p:txBody>
@@ -17332,43 +16436,6 @@
           <a:lstStyle/>
           <a:p>
             <a:endParaRPr lang="en-US" sz="2229"/>
-          </a:p>
-        </p:txBody>
-      </p:sp>
-      <p:sp>
-        <p:nvSpPr>
-          <p:cNvPr id="2" name="TextBox 1">
-            <a:extLst>
-              <a:ext uri="{FF2B5EF4-FFF2-40B4-BE49-F238E27FC236}">
-                <a16:creationId xmlns:a16="http://schemas.microsoft.com/office/drawing/2014/main" id="{7896A7BA-08CF-32E6-6836-EBE01A61209D}"/>
-              </a:ext>
-            </a:extLst>
-          </p:cNvPr>
-          <p:cNvSpPr txBox="1"/>
-          <p:nvPr/>
-        </p:nvSpPr>
-        <p:spPr>
-          <a:xfrm>
-            <a:off x="487346" y="644086"/>
-            <a:ext cx="1119217" cy="376742"/>
-          </a:xfrm>
-          <a:prstGeom prst="rect">
-            <a:avLst/>
-          </a:prstGeom>
-          <a:noFill/>
-        </p:spPr>
-        <p:txBody>
-          <a:bodyPr wrap="none" rtlCol="0">
-            <a:spAutoFit/>
-          </a:bodyPr>
-          <a:lstStyle/>
-          <a:p>
-            <a:r>
-              <a:rPr lang="en-US" dirty="0">
-                <a:latin typeface="Gaegu" pitchFamily="2" charset="0"/>
-              </a:rPr>
-              <a:t>The Stack</a:t>
-            </a:r>
           </a:p>
         </p:txBody>
       </p:sp>
@@ -21509,266 +20576,6 @@
       </p:grpSp>
       <p:sp>
         <p:nvSpPr>
-          <p:cNvPr id="57" name="TextBox 56">
-            <a:extLst>
-              <a:ext uri="{FF2B5EF4-FFF2-40B4-BE49-F238E27FC236}">
-                <a16:creationId xmlns:a16="http://schemas.microsoft.com/office/drawing/2014/main" id="{33202482-3DB7-2F05-41AD-BB732D9D955B}"/>
-              </a:ext>
-            </a:extLst>
-          </p:cNvPr>
-          <p:cNvSpPr txBox="1"/>
-          <p:nvPr/>
-        </p:nvSpPr>
-        <p:spPr>
-          <a:xfrm>
-            <a:off x="47480" y="101726"/>
-            <a:ext cx="5678827" cy="369332"/>
-          </a:xfrm>
-          <a:prstGeom prst="rect">
-            <a:avLst/>
-          </a:prstGeom>
-          <a:noFill/>
-        </p:spPr>
-        <p:txBody>
-          <a:bodyPr wrap="square">
-            <a:spAutoFit/>
-          </a:bodyPr>
-          <a:lstStyle/>
-          <a:p>
-            <a:r>
-              <a:rPr lang="en-US" dirty="0">
-                <a:latin typeface="Gaegu" pitchFamily="2" charset="0"/>
-              </a:rPr>
-              <a:t>Assignment – </a:t>
-            </a:r>
-            <a:r>
-              <a:rPr lang="en-US" b="1" dirty="0">
-                <a:latin typeface="Gaegu" pitchFamily="2" charset="0"/>
-              </a:rPr>
-              <a:t>how does the sequence work for a double?</a:t>
-            </a:r>
-            <a:endParaRPr lang="en-US" b="1" dirty="0"/>
-          </a:p>
-        </p:txBody>
-      </p:sp>
-      <p:sp>
-        <p:nvSpPr>
-          <p:cNvPr id="61" name="Rectangle 60">
-            <a:extLst>
-              <a:ext uri="{FF2B5EF4-FFF2-40B4-BE49-F238E27FC236}">
-                <a16:creationId xmlns:a16="http://schemas.microsoft.com/office/drawing/2014/main" id="{1A9D7769-4C5F-B1BE-EEB2-AF76F839B25B}"/>
-              </a:ext>
-            </a:extLst>
-          </p:cNvPr>
-          <p:cNvSpPr/>
-          <p:nvPr/>
-        </p:nvSpPr>
-        <p:spPr>
-          <a:xfrm>
-            <a:off x="5726307" y="770958"/>
-            <a:ext cx="1424246" cy="566230"/>
-          </a:xfrm>
-          <a:custGeom>
-            <a:avLst/>
-            <a:gdLst>
-              <a:gd name="connsiteX0" fmla="*/ 0 w 1424246"/>
-              <a:gd name="connsiteY0" fmla="*/ 0 h 566230"/>
-              <a:gd name="connsiteX1" fmla="*/ 503234 w 1424246"/>
-              <a:gd name="connsiteY1" fmla="*/ 0 h 566230"/>
-              <a:gd name="connsiteX2" fmla="*/ 992225 w 1424246"/>
-              <a:gd name="connsiteY2" fmla="*/ 0 h 566230"/>
-              <a:gd name="connsiteX3" fmla="*/ 1424246 w 1424246"/>
-              <a:gd name="connsiteY3" fmla="*/ 0 h 566230"/>
-              <a:gd name="connsiteX4" fmla="*/ 1424246 w 1424246"/>
-              <a:gd name="connsiteY4" fmla="*/ 566230 h 566230"/>
-              <a:gd name="connsiteX5" fmla="*/ 977982 w 1424246"/>
-              <a:gd name="connsiteY5" fmla="*/ 566230 h 566230"/>
-              <a:gd name="connsiteX6" fmla="*/ 503234 w 1424246"/>
-              <a:gd name="connsiteY6" fmla="*/ 566230 h 566230"/>
-              <a:gd name="connsiteX7" fmla="*/ 0 w 1424246"/>
-              <a:gd name="connsiteY7" fmla="*/ 566230 h 566230"/>
-              <a:gd name="connsiteX8" fmla="*/ 0 w 1424246"/>
-              <a:gd name="connsiteY8" fmla="*/ 0 h 566230"/>
-            </a:gdLst>
-            <a:ahLst/>
-            <a:cxnLst>
-              <a:cxn ang="0">
-                <a:pos x="connsiteX0" y="connsiteY0"/>
-              </a:cxn>
-              <a:cxn ang="0">
-                <a:pos x="connsiteX1" y="connsiteY1"/>
-              </a:cxn>
-              <a:cxn ang="0">
-                <a:pos x="connsiteX2" y="connsiteY2"/>
-              </a:cxn>
-              <a:cxn ang="0">
-                <a:pos x="connsiteX3" y="connsiteY3"/>
-              </a:cxn>
-              <a:cxn ang="0">
-                <a:pos x="connsiteX4" y="connsiteY4"/>
-              </a:cxn>
-              <a:cxn ang="0">
-                <a:pos x="connsiteX5" y="connsiteY5"/>
-              </a:cxn>
-              <a:cxn ang="0">
-                <a:pos x="connsiteX6" y="connsiteY6"/>
-              </a:cxn>
-              <a:cxn ang="0">
-                <a:pos x="connsiteX7" y="connsiteY7"/>
-              </a:cxn>
-              <a:cxn ang="0">
-                <a:pos x="connsiteX8" y="connsiteY8"/>
-              </a:cxn>
-            </a:cxnLst>
-            <a:rect l="l" t="t" r="r" b="b"/>
-            <a:pathLst>
-              <a:path w="1424246" h="566230" fill="none" extrusionOk="0">
-                <a:moveTo>
-                  <a:pt x="0" y="0"/>
-                </a:moveTo>
-                <a:cubicBezTo>
-                  <a:pt x="146395" y="-20581"/>
-                  <a:pt x="333935" y="-6048"/>
-                  <a:pt x="503234" y="0"/>
-                </a:cubicBezTo>
-                <a:cubicBezTo>
-                  <a:pt x="672533" y="6048"/>
-                  <a:pt x="751908" y="20089"/>
-                  <a:pt x="992225" y="0"/>
-                </a:cubicBezTo>
-                <a:cubicBezTo>
-                  <a:pt x="1232542" y="-20089"/>
-                  <a:pt x="1240447" y="-18236"/>
-                  <a:pt x="1424246" y="0"/>
-                </a:cubicBezTo>
-                <a:cubicBezTo>
-                  <a:pt x="1427554" y="253370"/>
-                  <a:pt x="1431334" y="427984"/>
-                  <a:pt x="1424246" y="566230"/>
-                </a:cubicBezTo>
-                <a:cubicBezTo>
-                  <a:pt x="1220670" y="572890"/>
-                  <a:pt x="1126049" y="561364"/>
-                  <a:pt x="977982" y="566230"/>
-                </a:cubicBezTo>
-                <a:cubicBezTo>
-                  <a:pt x="829915" y="571096"/>
-                  <a:pt x="610267" y="577826"/>
-                  <a:pt x="503234" y="566230"/>
-                </a:cubicBezTo>
-                <a:cubicBezTo>
-                  <a:pt x="396201" y="554634"/>
-                  <a:pt x="165116" y="581184"/>
-                  <a:pt x="0" y="566230"/>
-                </a:cubicBezTo>
-                <a:cubicBezTo>
-                  <a:pt x="11090" y="403140"/>
-                  <a:pt x="-25383" y="130532"/>
-                  <a:pt x="0" y="0"/>
-                </a:cubicBezTo>
-                <a:close/>
-              </a:path>
-              <a:path w="1424246" h="566230" stroke="0" extrusionOk="0">
-                <a:moveTo>
-                  <a:pt x="0" y="0"/>
-                </a:moveTo>
-                <a:cubicBezTo>
-                  <a:pt x="182809" y="-22807"/>
-                  <a:pt x="254366" y="14185"/>
-                  <a:pt x="460506" y="0"/>
-                </a:cubicBezTo>
-                <a:cubicBezTo>
-                  <a:pt x="666646" y="-14185"/>
-                  <a:pt x="758179" y="10989"/>
-                  <a:pt x="892527" y="0"/>
-                </a:cubicBezTo>
-                <a:cubicBezTo>
-                  <a:pt x="1026875" y="-10989"/>
-                  <a:pt x="1311050" y="14364"/>
-                  <a:pt x="1424246" y="0"/>
-                </a:cubicBezTo>
-                <a:cubicBezTo>
-                  <a:pt x="1407869" y="224877"/>
-                  <a:pt x="1440712" y="382845"/>
-                  <a:pt x="1424246" y="566230"/>
-                </a:cubicBezTo>
-                <a:cubicBezTo>
-                  <a:pt x="1327244" y="581071"/>
-                  <a:pt x="1070376" y="563472"/>
-                  <a:pt x="977982" y="566230"/>
-                </a:cubicBezTo>
-                <a:cubicBezTo>
-                  <a:pt x="885588" y="568988"/>
-                  <a:pt x="703260" y="545129"/>
-                  <a:pt x="474749" y="566230"/>
-                </a:cubicBezTo>
-                <a:cubicBezTo>
-                  <a:pt x="246238" y="587331"/>
-                  <a:pt x="132251" y="563742"/>
-                  <a:pt x="0" y="566230"/>
-                </a:cubicBezTo>
-                <a:cubicBezTo>
-                  <a:pt x="16645" y="324791"/>
-                  <a:pt x="-9527" y="216535"/>
-                  <a:pt x="0" y="0"/>
-                </a:cubicBezTo>
-                <a:close/>
-              </a:path>
-            </a:pathLst>
-          </a:custGeom>
-          <a:solidFill>
-            <a:schemeClr val="accent4">
-              <a:lumMod val="60000"/>
-              <a:lumOff val="40000"/>
-            </a:schemeClr>
-          </a:solidFill>
-          <a:ln w="12700">
-            <a:solidFill>
-              <a:schemeClr val="tx1"/>
-            </a:solidFill>
-            <a:extLst>
-              <a:ext uri="{C807C97D-BFC1-408E-A445-0C87EB9F89A2}">
-                <ask:lineSketchStyleProps xmlns:ask="http://schemas.microsoft.com/office/drawing/2018/sketchyshapes" sd="1219033472">
-                  <a:prstGeom prst="rect">
-                    <a:avLst/>
-                  </a:prstGeom>
-                  <ask:type>
-                    <ask:lineSketchFreehand/>
-                  </ask:type>
-                </ask:lineSketchStyleProps>
-              </a:ext>
-            </a:extLst>
-          </a:ln>
-          <a:effectLst/>
-        </p:spPr>
-        <p:style>
-          <a:lnRef idx="1">
-            <a:schemeClr val="accent4"/>
-          </a:lnRef>
-          <a:fillRef idx="2">
-            <a:schemeClr val="accent4"/>
-          </a:fillRef>
-          <a:effectRef idx="1">
-            <a:schemeClr val="accent4"/>
-          </a:effectRef>
-          <a:fontRef idx="minor">
-            <a:schemeClr val="dk1"/>
-          </a:fontRef>
-        </p:style>
-        <p:txBody>
-          <a:bodyPr rtlCol="0" anchor="ctr"/>
-          <a:lstStyle/>
-          <a:p>
-            <a:pPr algn="ctr"/>
-            <a:r>
-              <a:rPr lang="en-US" sz="1400" dirty="0"/>
-              <a:t>Increment the program counter</a:t>
-            </a:r>
-          </a:p>
-        </p:txBody>
-      </p:sp>
-      <p:sp>
-        <p:nvSpPr>
           <p:cNvPr id="63" name="TextBox 62">
             <a:extLst>
               <a:ext uri="{FF2B5EF4-FFF2-40B4-BE49-F238E27FC236}">
@@ -21960,6 +20767,43 @@
           <a:lstStyle/>
           <a:p>
             <a:endParaRPr lang="en-US" dirty="0"/>
+          </a:p>
+        </p:txBody>
+      </p:sp>
+      <p:sp>
+        <p:nvSpPr>
+          <p:cNvPr id="13" name="TextBox 12">
+            <a:extLst>
+              <a:ext uri="{FF2B5EF4-FFF2-40B4-BE49-F238E27FC236}">
+                <a16:creationId xmlns:a16="http://schemas.microsoft.com/office/drawing/2014/main" id="{168908AA-C3DA-5236-A028-D21508880445}"/>
+              </a:ext>
+            </a:extLst>
+          </p:cNvPr>
+          <p:cNvSpPr txBox="1"/>
+          <p:nvPr/>
+        </p:nvSpPr>
+        <p:spPr>
+          <a:xfrm>
+            <a:off x="6318654" y="213481"/>
+            <a:ext cx="923651" cy="369332"/>
+          </a:xfrm>
+          <a:prstGeom prst="rect">
+            <a:avLst/>
+          </a:prstGeom>
+          <a:noFill/>
+        </p:spPr>
+        <p:txBody>
+          <a:bodyPr wrap="none" rtlCol="0">
+            <a:spAutoFit/>
+          </a:bodyPr>
+          <a:lstStyle/>
+          <a:p>
+            <a:r>
+              <a:rPr lang="en-US" dirty="0">
+                <a:latin typeface="Gaegu" pitchFamily="2" charset="0"/>
+              </a:rPr>
+              <a:t>Memory</a:t>
+            </a:r>
           </a:p>
         </p:txBody>
       </p:sp>
@@ -26352,6 +25196,43 @@
           </p:style>
         </p:cxnSp>
       </p:grpSp>
+      <p:sp>
+        <p:nvSpPr>
+          <p:cNvPr id="2" name="TextBox 1">
+            <a:extLst>
+              <a:ext uri="{FF2B5EF4-FFF2-40B4-BE49-F238E27FC236}">
+                <a16:creationId xmlns:a16="http://schemas.microsoft.com/office/drawing/2014/main" id="{62B70A08-8648-D527-8E2E-3E60A7BF43DD}"/>
+              </a:ext>
+            </a:extLst>
+          </p:cNvPr>
+          <p:cNvSpPr txBox="1"/>
+          <p:nvPr/>
+        </p:nvSpPr>
+        <p:spPr>
+          <a:xfrm>
+            <a:off x="6318654" y="213481"/>
+            <a:ext cx="923651" cy="369332"/>
+          </a:xfrm>
+          <a:prstGeom prst="rect">
+            <a:avLst/>
+          </a:prstGeom>
+          <a:noFill/>
+        </p:spPr>
+        <p:txBody>
+          <a:bodyPr wrap="none" rtlCol="0">
+            <a:spAutoFit/>
+          </a:bodyPr>
+          <a:lstStyle/>
+          <a:p>
+            <a:r>
+              <a:rPr lang="en-US" dirty="0">
+                <a:latin typeface="Gaegu" pitchFamily="2" charset="0"/>
+              </a:rPr>
+              <a:t>Memory</a:t>
+            </a:r>
+          </a:p>
+        </p:txBody>
+      </p:sp>
     </p:spTree>
     <p:extLst>
       <p:ext uri="{BB962C8B-B14F-4D97-AF65-F5344CB8AC3E}">
@@ -31000,6 +29881,43 @@
           </a:p>
         </p:txBody>
       </p:sp>
+      <p:sp>
+        <p:nvSpPr>
+          <p:cNvPr id="3" name="TextBox 2">
+            <a:extLst>
+              <a:ext uri="{FF2B5EF4-FFF2-40B4-BE49-F238E27FC236}">
+                <a16:creationId xmlns:a16="http://schemas.microsoft.com/office/drawing/2014/main" id="{F888C2F1-785B-C466-9CEE-67FFE33D841B}"/>
+              </a:ext>
+            </a:extLst>
+          </p:cNvPr>
+          <p:cNvSpPr txBox="1"/>
+          <p:nvPr/>
+        </p:nvSpPr>
+        <p:spPr>
+          <a:xfrm>
+            <a:off x="6318654" y="213481"/>
+            <a:ext cx="923651" cy="369332"/>
+          </a:xfrm>
+          <a:prstGeom prst="rect">
+            <a:avLst/>
+          </a:prstGeom>
+          <a:noFill/>
+        </p:spPr>
+        <p:txBody>
+          <a:bodyPr wrap="none" rtlCol="0">
+            <a:spAutoFit/>
+          </a:bodyPr>
+          <a:lstStyle/>
+          <a:p>
+            <a:r>
+              <a:rPr lang="en-US" dirty="0">
+                <a:latin typeface="Gaegu" pitchFamily="2" charset="0"/>
+              </a:rPr>
+              <a:t>Memory</a:t>
+            </a:r>
+          </a:p>
+        </p:txBody>
+      </p:sp>
     </p:spTree>
     <p:extLst>
       <p:ext uri="{BB962C8B-B14F-4D97-AF65-F5344CB8AC3E}">

</xml_diff>